<commit_message>
updated slides for day4
</commit_message>
<xml_diff>
--- a/doc/slides/day4/session1/VisualWorkflows.pptx
+++ b/doc/slides/day4/session1/VisualWorkflows.pptx
@@ -1,6 +1,6 @@
 
 <file path=ppt/presentation.xml><?xml version="1.0" encoding="utf-8"?>
-<p:presentation xmlns:a="http://schemas.openxmlformats.org/drawingml/2006/main" xmlns:r="http://schemas.openxmlformats.org/officeDocument/2006/relationships" xmlns:mc="http://schemas.openxmlformats.org/markup-compatibility/2006" xmlns:mv="urn:schemas-microsoft-com:mac:vml" xmlns:p="http://schemas.openxmlformats.org/presentationml/2006/main" mc:Ignorable="mv" mc:PreserveAttributes="mv:*" saveSubsetFonts="1" autoCompressPictures="0">
+<p:presentation xmlns:a="http://schemas.openxmlformats.org/drawingml/2006/main" xmlns:r="http://schemas.openxmlformats.org/officeDocument/2006/relationships" xmlns:p="http://schemas.openxmlformats.org/presentationml/2006/main" saveSubsetFonts="1" autoCompressPictures="0">
   <p:sldMasterIdLst>
     <p:sldMasterId id="2147483648" r:id="rId1"/>
   </p:sldMasterIdLst>
@@ -121,7 +121,7 @@
 </file>
 
 <file path=ppt/notesMasters/notesMaster1.xml><?xml version="1.0" encoding="utf-8"?>
-<p:notesMaster xmlns:a="http://schemas.openxmlformats.org/drawingml/2006/main" xmlns:r="http://schemas.openxmlformats.org/officeDocument/2006/relationships" xmlns:mc="http://schemas.openxmlformats.org/markup-compatibility/2006" xmlns:mv="urn:schemas-microsoft-com:mac:vml" xmlns:p="http://schemas.openxmlformats.org/presentationml/2006/main" mc:Ignorable="mv" mc:PreserveAttributes="mv:*">
+<p:notesMaster xmlns:a="http://schemas.openxmlformats.org/drawingml/2006/main" xmlns:r="http://schemas.openxmlformats.org/officeDocument/2006/relationships" xmlns:p="http://schemas.openxmlformats.org/presentationml/2006/main">
   <p:cSld>
     <p:bg>
       <p:bgRef idx="1001">
@@ -203,7 +203,7 @@
             <a:fld id="{CB97A5B2-D33E-654E-80C8-D06B63D580AC}" type="datetimeFigureOut">
               <a:rPr lang="en-US" smtClean="0"/>
               <a:pPr/>
-              <a:t>9/5/12</a:t>
+              <a:t>9/6/12</a:t>
             </a:fld>
             <a:endParaRPr lang="en-US"/>
           </a:p>
@@ -372,6 +372,11 @@
         </p:txBody>
       </p:sp>
     </p:spTree>
+    <p:extLst>
+      <p:ext uri="{BB962C8B-B14F-4D97-AF65-F5344CB8AC3E}">
+        <p14:creationId xmlns:p14="http://schemas.microsoft.com/office/powerpoint/2010/main" val="3164363534"/>
+      </p:ext>
+    </p:extLst>
   </p:cSld>
   <p:clrMap bg1="lt1" tx1="dk1" bg2="lt2" tx2="dk2" accent1="accent1" accent2="accent2" accent3="accent3" accent4="accent4" accent5="accent5" accent6="accent6" hlink="hlink" folHlink="folHlink"/>
   <p:notesStyle>
@@ -470,7 +475,7 @@
 </file>
 
 <file path=ppt/notesSlides/notesSlide1.xml><?xml version="1.0" encoding="utf-8"?>
-<p:notes xmlns:a="http://schemas.openxmlformats.org/drawingml/2006/main" xmlns:r="http://schemas.openxmlformats.org/officeDocument/2006/relationships" xmlns:mc="http://schemas.openxmlformats.org/markup-compatibility/2006" xmlns:mv="urn:schemas-microsoft-com:mac:vml" xmlns:p="http://schemas.openxmlformats.org/presentationml/2006/main" mc:Ignorable="mv" mc:PreserveAttributes="mv:*">
+<p:notes xmlns:a="http://schemas.openxmlformats.org/drawingml/2006/main" xmlns:r="http://schemas.openxmlformats.org/officeDocument/2006/relationships" xmlns:p="http://schemas.openxmlformats.org/presentationml/2006/main">
   <p:cSld>
     <p:spTree>
       <p:nvGrpSpPr>
@@ -576,7 +581,7 @@
 </file>
 
 <file path=ppt/notesSlides/notesSlide2.xml><?xml version="1.0" encoding="utf-8"?>
-<p:notes xmlns:a="http://schemas.openxmlformats.org/drawingml/2006/main" xmlns:r="http://schemas.openxmlformats.org/officeDocument/2006/relationships" xmlns:mc="http://schemas.openxmlformats.org/markup-compatibility/2006" xmlns:mv="urn:schemas-microsoft-com:mac:vml" xmlns:p="http://schemas.openxmlformats.org/presentationml/2006/main" mc:Ignorable="mv" mc:PreserveAttributes="mv:*">
+<p:notes xmlns:a="http://schemas.openxmlformats.org/drawingml/2006/main" xmlns:r="http://schemas.openxmlformats.org/officeDocument/2006/relationships" xmlns:p="http://schemas.openxmlformats.org/presentationml/2006/main">
   <p:cSld>
     <p:spTree>
       <p:nvGrpSpPr>
@@ -666,7 +671,7 @@
 </file>
 
 <file path=ppt/slideLayouts/slideLayout1.xml><?xml version="1.0" encoding="utf-8"?>
-<p:sldLayout xmlns:a="http://schemas.openxmlformats.org/drawingml/2006/main" xmlns:r="http://schemas.openxmlformats.org/officeDocument/2006/relationships" xmlns:mc="http://schemas.openxmlformats.org/markup-compatibility/2006" xmlns:mv="urn:schemas-microsoft-com:mac:vml" xmlns:p="http://schemas.openxmlformats.org/presentationml/2006/main" mc:Ignorable="mv" mc:PreserveAttributes="mv:*" type="title" preserve="1">
+<p:sldLayout xmlns:a="http://schemas.openxmlformats.org/drawingml/2006/main" xmlns:r="http://schemas.openxmlformats.org/officeDocument/2006/relationships" xmlns:p="http://schemas.openxmlformats.org/presentationml/2006/main" type="title" preserve="1">
   <p:cSld name="Title Slide">
     <p:spTree>
       <p:nvGrpSpPr>
@@ -847,7 +852,7 @@
             <a:fld id="{A70B51AF-CB11-414E-96EA-7C3CBC48D1AF}" type="datetimeFigureOut">
               <a:rPr lang="en-US" smtClean="0"/>
               <a:pPr/>
-              <a:t>9/5/12</a:t>
+              <a:t>9/6/12</a:t>
             </a:fld>
             <a:endParaRPr lang="en-US"/>
           </a:p>
@@ -905,7 +910,7 @@
 </file>
 
 <file path=ppt/slideLayouts/slideLayout10.xml><?xml version="1.0" encoding="utf-8"?>
-<p:sldLayout xmlns:a="http://schemas.openxmlformats.org/drawingml/2006/main" xmlns:r="http://schemas.openxmlformats.org/officeDocument/2006/relationships" xmlns:mc="http://schemas.openxmlformats.org/markup-compatibility/2006" xmlns:mv="urn:schemas-microsoft-com:mac:vml" xmlns:p="http://schemas.openxmlformats.org/presentationml/2006/main" mc:Ignorable="mv" mc:PreserveAttributes="mv:*" type="vertTx" preserve="1">
+<p:sldLayout xmlns:a="http://schemas.openxmlformats.org/drawingml/2006/main" xmlns:r="http://schemas.openxmlformats.org/officeDocument/2006/relationships" xmlns:p="http://schemas.openxmlformats.org/presentationml/2006/main" type="vertTx" preserve="1">
   <p:cSld name="Title and Vertical Text">
     <p:spTree>
       <p:nvGrpSpPr>
@@ -1014,7 +1019,7 @@
             <a:fld id="{A70B51AF-CB11-414E-96EA-7C3CBC48D1AF}" type="datetimeFigureOut">
               <a:rPr lang="en-US" smtClean="0"/>
               <a:pPr/>
-              <a:t>9/5/12</a:t>
+              <a:t>9/6/12</a:t>
             </a:fld>
             <a:endParaRPr lang="en-US"/>
           </a:p>
@@ -1072,7 +1077,7 @@
 </file>
 
 <file path=ppt/slideLayouts/slideLayout11.xml><?xml version="1.0" encoding="utf-8"?>
-<p:sldLayout xmlns:a="http://schemas.openxmlformats.org/drawingml/2006/main" xmlns:r="http://schemas.openxmlformats.org/officeDocument/2006/relationships" xmlns:mc="http://schemas.openxmlformats.org/markup-compatibility/2006" xmlns:mv="urn:schemas-microsoft-com:mac:vml" xmlns:p="http://schemas.openxmlformats.org/presentationml/2006/main" mc:Ignorable="mv" mc:PreserveAttributes="mv:*" type="vertTitleAndTx" preserve="1">
+<p:sldLayout xmlns:a="http://schemas.openxmlformats.org/drawingml/2006/main" xmlns:r="http://schemas.openxmlformats.org/officeDocument/2006/relationships" xmlns:p="http://schemas.openxmlformats.org/presentationml/2006/main" type="vertTitleAndTx" preserve="1">
   <p:cSld name="Vertical Title and Text">
     <p:spTree>
       <p:nvGrpSpPr>
@@ -1191,7 +1196,7 @@
             <a:fld id="{A70B51AF-CB11-414E-96EA-7C3CBC48D1AF}" type="datetimeFigureOut">
               <a:rPr lang="en-US" smtClean="0"/>
               <a:pPr/>
-              <a:t>9/5/12</a:t>
+              <a:t>9/6/12</a:t>
             </a:fld>
             <a:endParaRPr lang="en-US"/>
           </a:p>
@@ -1249,7 +1254,7 @@
 </file>
 
 <file path=ppt/slideLayouts/slideLayout2.xml><?xml version="1.0" encoding="utf-8"?>
-<p:sldLayout xmlns:a="http://schemas.openxmlformats.org/drawingml/2006/main" xmlns:r="http://schemas.openxmlformats.org/officeDocument/2006/relationships" xmlns:mc="http://schemas.openxmlformats.org/markup-compatibility/2006" xmlns:mv="urn:schemas-microsoft-com:mac:vml" xmlns:p="http://schemas.openxmlformats.org/presentationml/2006/main" mc:Ignorable="mv" mc:PreserveAttributes="mv:*" type="obj" preserve="1">
+<p:sldLayout xmlns:a="http://schemas.openxmlformats.org/drawingml/2006/main" xmlns:r="http://schemas.openxmlformats.org/officeDocument/2006/relationships" xmlns:p="http://schemas.openxmlformats.org/presentationml/2006/main" type="obj" preserve="1">
   <p:cSld name="Title and Content">
     <p:spTree>
       <p:nvGrpSpPr>
@@ -1358,7 +1363,7 @@
             <a:fld id="{A70B51AF-CB11-414E-96EA-7C3CBC48D1AF}" type="datetimeFigureOut">
               <a:rPr lang="en-US" smtClean="0"/>
               <a:pPr/>
-              <a:t>9/5/12</a:t>
+              <a:t>9/6/12</a:t>
             </a:fld>
             <a:endParaRPr lang="en-US"/>
           </a:p>
@@ -1416,7 +1421,7 @@
 </file>
 
 <file path=ppt/slideLayouts/slideLayout3.xml><?xml version="1.0" encoding="utf-8"?>
-<p:sldLayout xmlns:a="http://schemas.openxmlformats.org/drawingml/2006/main" xmlns:r="http://schemas.openxmlformats.org/officeDocument/2006/relationships" xmlns:mc="http://schemas.openxmlformats.org/markup-compatibility/2006" xmlns:mv="urn:schemas-microsoft-com:mac:vml" xmlns:p="http://schemas.openxmlformats.org/presentationml/2006/main" mc:Ignorable="mv" mc:PreserveAttributes="mv:*" type="secHead" preserve="1">
+<p:sldLayout xmlns:a="http://schemas.openxmlformats.org/drawingml/2006/main" xmlns:r="http://schemas.openxmlformats.org/officeDocument/2006/relationships" xmlns:p="http://schemas.openxmlformats.org/presentationml/2006/main" type="secHead" preserve="1">
   <p:cSld name="Section Header">
     <p:spTree>
       <p:nvGrpSpPr>
@@ -1601,7 +1606,7 @@
             <a:fld id="{A70B51AF-CB11-414E-96EA-7C3CBC48D1AF}" type="datetimeFigureOut">
               <a:rPr lang="en-US" smtClean="0"/>
               <a:pPr/>
-              <a:t>9/5/12</a:t>
+              <a:t>9/6/12</a:t>
             </a:fld>
             <a:endParaRPr lang="en-US"/>
           </a:p>
@@ -1659,7 +1664,7 @@
 </file>
 
 <file path=ppt/slideLayouts/slideLayout4.xml><?xml version="1.0" encoding="utf-8"?>
-<p:sldLayout xmlns:a="http://schemas.openxmlformats.org/drawingml/2006/main" xmlns:r="http://schemas.openxmlformats.org/officeDocument/2006/relationships" xmlns:mc="http://schemas.openxmlformats.org/markup-compatibility/2006" xmlns:mv="urn:schemas-microsoft-com:mac:vml" xmlns:p="http://schemas.openxmlformats.org/presentationml/2006/main" mc:Ignorable="mv" mc:PreserveAttributes="mv:*" type="twoObj" preserve="1">
+<p:sldLayout xmlns:a="http://schemas.openxmlformats.org/drawingml/2006/main" xmlns:r="http://schemas.openxmlformats.org/officeDocument/2006/relationships" xmlns:p="http://schemas.openxmlformats.org/presentationml/2006/main" type="twoObj" preserve="1">
   <p:cSld name="Two Content">
     <p:spTree>
       <p:nvGrpSpPr>
@@ -1886,7 +1891,7 @@
             <a:fld id="{A70B51AF-CB11-414E-96EA-7C3CBC48D1AF}" type="datetimeFigureOut">
               <a:rPr lang="en-US" smtClean="0"/>
               <a:pPr/>
-              <a:t>9/5/12</a:t>
+              <a:t>9/6/12</a:t>
             </a:fld>
             <a:endParaRPr lang="en-US"/>
           </a:p>
@@ -1944,7 +1949,7 @@
 </file>
 
 <file path=ppt/slideLayouts/slideLayout5.xml><?xml version="1.0" encoding="utf-8"?>
-<p:sldLayout xmlns:a="http://schemas.openxmlformats.org/drawingml/2006/main" xmlns:r="http://schemas.openxmlformats.org/officeDocument/2006/relationships" xmlns:mc="http://schemas.openxmlformats.org/markup-compatibility/2006" xmlns:mv="urn:schemas-microsoft-com:mac:vml" xmlns:p="http://schemas.openxmlformats.org/presentationml/2006/main" mc:Ignorable="mv" mc:PreserveAttributes="mv:*" type="twoTxTwoObj" preserve="1">
+<p:sldLayout xmlns:a="http://schemas.openxmlformats.org/drawingml/2006/main" xmlns:r="http://schemas.openxmlformats.org/officeDocument/2006/relationships" xmlns:p="http://schemas.openxmlformats.org/presentationml/2006/main" type="twoTxTwoObj" preserve="1">
   <p:cSld name="Comparison">
     <p:spTree>
       <p:nvGrpSpPr>
@@ -2305,7 +2310,7 @@
             <a:fld id="{A70B51AF-CB11-414E-96EA-7C3CBC48D1AF}" type="datetimeFigureOut">
               <a:rPr lang="en-US" smtClean="0"/>
               <a:pPr/>
-              <a:t>9/5/12</a:t>
+              <a:t>9/6/12</a:t>
             </a:fld>
             <a:endParaRPr lang="en-US"/>
           </a:p>
@@ -2363,7 +2368,7 @@
 </file>
 
 <file path=ppt/slideLayouts/slideLayout6.xml><?xml version="1.0" encoding="utf-8"?>
-<p:sldLayout xmlns:a="http://schemas.openxmlformats.org/drawingml/2006/main" xmlns:r="http://schemas.openxmlformats.org/officeDocument/2006/relationships" xmlns:mc="http://schemas.openxmlformats.org/markup-compatibility/2006" xmlns:mv="urn:schemas-microsoft-com:mac:vml" xmlns:p="http://schemas.openxmlformats.org/presentationml/2006/main" mc:Ignorable="mv" mc:PreserveAttributes="mv:*" type="titleOnly" preserve="1">
+<p:sldLayout xmlns:a="http://schemas.openxmlformats.org/drawingml/2006/main" xmlns:r="http://schemas.openxmlformats.org/officeDocument/2006/relationships" xmlns:p="http://schemas.openxmlformats.org/presentationml/2006/main" type="titleOnly" preserve="1">
   <p:cSld name="Title Only">
     <p:spTree>
       <p:nvGrpSpPr>
@@ -2420,7 +2425,7 @@
             <a:fld id="{A70B51AF-CB11-414E-96EA-7C3CBC48D1AF}" type="datetimeFigureOut">
               <a:rPr lang="en-US" smtClean="0"/>
               <a:pPr/>
-              <a:t>9/5/12</a:t>
+              <a:t>9/6/12</a:t>
             </a:fld>
             <a:endParaRPr lang="en-US"/>
           </a:p>
@@ -2478,7 +2483,7 @@
 </file>
 
 <file path=ppt/slideLayouts/slideLayout7.xml><?xml version="1.0" encoding="utf-8"?>
-<p:sldLayout xmlns:a="http://schemas.openxmlformats.org/drawingml/2006/main" xmlns:r="http://schemas.openxmlformats.org/officeDocument/2006/relationships" xmlns:mc="http://schemas.openxmlformats.org/markup-compatibility/2006" xmlns:mv="urn:schemas-microsoft-com:mac:vml" xmlns:p="http://schemas.openxmlformats.org/presentationml/2006/main" mc:Ignorable="mv" mc:PreserveAttributes="mv:*" type="blank" preserve="1">
+<p:sldLayout xmlns:a="http://schemas.openxmlformats.org/drawingml/2006/main" xmlns:r="http://schemas.openxmlformats.org/officeDocument/2006/relationships" xmlns:p="http://schemas.openxmlformats.org/presentationml/2006/main" type="blank" preserve="1">
   <p:cSld name="Blank">
     <p:spTree>
       <p:nvGrpSpPr>
@@ -2512,7 +2517,7 @@
             <a:fld id="{A70B51AF-CB11-414E-96EA-7C3CBC48D1AF}" type="datetimeFigureOut">
               <a:rPr lang="en-US" smtClean="0"/>
               <a:pPr/>
-              <a:t>9/5/12</a:t>
+              <a:t>9/6/12</a:t>
             </a:fld>
             <a:endParaRPr lang="en-US"/>
           </a:p>
@@ -2570,7 +2575,7 @@
 </file>
 
 <file path=ppt/slideLayouts/slideLayout8.xml><?xml version="1.0" encoding="utf-8"?>
-<p:sldLayout xmlns:a="http://schemas.openxmlformats.org/drawingml/2006/main" xmlns:r="http://schemas.openxmlformats.org/officeDocument/2006/relationships" xmlns:mc="http://schemas.openxmlformats.org/markup-compatibility/2006" xmlns:mv="urn:schemas-microsoft-com:mac:vml" xmlns:p="http://schemas.openxmlformats.org/presentationml/2006/main" mc:Ignorable="mv" mc:PreserveAttributes="mv:*" type="objTx" preserve="1">
+<p:sldLayout xmlns:a="http://schemas.openxmlformats.org/drawingml/2006/main" xmlns:r="http://schemas.openxmlformats.org/officeDocument/2006/relationships" xmlns:p="http://schemas.openxmlformats.org/presentationml/2006/main" type="objTx" preserve="1">
   <p:cSld name="Content with Caption">
     <p:spTree>
       <p:nvGrpSpPr>
@@ -2786,7 +2791,7 @@
             <a:fld id="{A70B51AF-CB11-414E-96EA-7C3CBC48D1AF}" type="datetimeFigureOut">
               <a:rPr lang="en-US" smtClean="0"/>
               <a:pPr/>
-              <a:t>9/5/12</a:t>
+              <a:t>9/6/12</a:t>
             </a:fld>
             <a:endParaRPr lang="en-US"/>
           </a:p>
@@ -2844,7 +2849,7 @@
 </file>
 
 <file path=ppt/slideLayouts/slideLayout9.xml><?xml version="1.0" encoding="utf-8"?>
-<p:sldLayout xmlns:a="http://schemas.openxmlformats.org/drawingml/2006/main" xmlns:r="http://schemas.openxmlformats.org/officeDocument/2006/relationships" xmlns:mc="http://schemas.openxmlformats.org/markup-compatibility/2006" xmlns:mv="urn:schemas-microsoft-com:mac:vml" xmlns:p="http://schemas.openxmlformats.org/presentationml/2006/main" mc:Ignorable="mv" mc:PreserveAttributes="mv:*" type="picTx" preserve="1">
+<p:sldLayout xmlns:a="http://schemas.openxmlformats.org/drawingml/2006/main" xmlns:r="http://schemas.openxmlformats.org/officeDocument/2006/relationships" xmlns:p="http://schemas.openxmlformats.org/presentationml/2006/main" type="picTx" preserve="1">
   <p:cSld name="Picture with Caption">
     <p:spTree>
       <p:nvGrpSpPr>
@@ -3036,7 +3041,7 @@
             <a:fld id="{A70B51AF-CB11-414E-96EA-7C3CBC48D1AF}" type="datetimeFigureOut">
               <a:rPr lang="en-US" smtClean="0"/>
               <a:pPr/>
-              <a:t>9/5/12</a:t>
+              <a:t>9/6/12</a:t>
             </a:fld>
             <a:endParaRPr lang="en-US"/>
           </a:p>
@@ -3094,7 +3099,7 @@
 </file>
 
 <file path=ppt/slideMasters/slideMaster1.xml><?xml version="1.0" encoding="utf-8"?>
-<p:sldMaster xmlns:a="http://schemas.openxmlformats.org/drawingml/2006/main" xmlns:r="http://schemas.openxmlformats.org/officeDocument/2006/relationships" xmlns:mc="http://schemas.openxmlformats.org/markup-compatibility/2006" xmlns:mv="urn:schemas-microsoft-com:mac:vml" xmlns:p="http://schemas.openxmlformats.org/presentationml/2006/main" mc:Ignorable="mv" mc:PreserveAttributes="mv:*">
+<p:sldMaster xmlns:a="http://schemas.openxmlformats.org/drawingml/2006/main" xmlns:r="http://schemas.openxmlformats.org/officeDocument/2006/relationships" xmlns:p="http://schemas.openxmlformats.org/presentationml/2006/main">
   <p:cSld>
     <p:bg>
       <p:bgRef idx="1001">
@@ -3246,7 +3251,7 @@
             <a:fld id="{A70B51AF-CB11-414E-96EA-7C3CBC48D1AF}" type="datetimeFigureOut">
               <a:rPr lang="en-US" smtClean="0"/>
               <a:pPr/>
-              <a:t>9/5/12</a:t>
+              <a:t>9/6/12</a:t>
             </a:fld>
             <a:endParaRPr lang="en-US"/>
           </a:p>
@@ -3601,7 +3606,7 @@
 </file>
 
 <file path=ppt/slides/slide1.xml><?xml version="1.0" encoding="utf-8"?>
-<p:sld xmlns:a="http://schemas.openxmlformats.org/drawingml/2006/main" xmlns:r="http://schemas.openxmlformats.org/officeDocument/2006/relationships" xmlns:mc="http://schemas.openxmlformats.org/markup-compatibility/2006" xmlns:mv="urn:schemas-microsoft-com:mac:vml" xmlns:p="http://schemas.openxmlformats.org/presentationml/2006/main" mc:Ignorable="mv" mc:PreserveAttributes="mv:*">
+<p:sld xmlns:a="http://schemas.openxmlformats.org/drawingml/2006/main" xmlns:r="http://schemas.openxmlformats.org/officeDocument/2006/relationships" xmlns:p="http://schemas.openxmlformats.org/presentationml/2006/main">
   <p:cSld>
     <p:spTree>
       <p:nvGrpSpPr>
@@ -3672,7 +3677,7 @@
 </file>
 
 <file path=ppt/slides/slide10.xml><?xml version="1.0" encoding="utf-8"?>
-<p:sld xmlns:a="http://schemas.openxmlformats.org/drawingml/2006/main" xmlns:r="http://schemas.openxmlformats.org/officeDocument/2006/relationships" xmlns:mc="http://schemas.openxmlformats.org/markup-compatibility/2006" xmlns:mv="urn:schemas-microsoft-com:mac:vml" xmlns:p="http://schemas.openxmlformats.org/presentationml/2006/main" mc:Ignorable="mv" mc:PreserveAttributes="mv:*">
+<p:sld xmlns:a="http://schemas.openxmlformats.org/drawingml/2006/main" xmlns:r="http://schemas.openxmlformats.org/officeDocument/2006/relationships" xmlns:p="http://schemas.openxmlformats.org/presentationml/2006/main">
   <p:cSld>
     <p:spTree>
       <p:nvGrpSpPr>
@@ -3734,25 +3739,31 @@
           </a:p>
         </p:txBody>
       </p:sp>
-      <p:sp>
-        <p:nvSpPr>
-          <p:cNvPr id="4" name="Content Placeholder 3"/>
-          <p:cNvSpPr>
-            <a:spLocks noGrp="1"/>
-          </p:cNvSpPr>
+      <p:pic>
+        <p:nvPicPr>
+          <p:cNvPr id="5" name="Content Placeholder 4" descr="ucsc-genome-browser1.png"/>
+          <p:cNvPicPr>
+            <a:picLocks noGrp="1" noChangeAspect="1"/>
+          </p:cNvPicPr>
           <p:nvPr>
             <p:ph sz="half" idx="2"/>
           </p:nvPr>
-        </p:nvSpPr>
-        <p:spPr/>
-        <p:txBody>
-          <a:bodyPr/>
-          <a:lstStyle/>
-          <a:p>
-            <a:endParaRPr lang="en-US"/>
-          </a:p>
-        </p:txBody>
-      </p:sp>
+        </p:nvPicPr>
+        <p:blipFill>
+          <a:blip r:embed="rId2">
+            <a:extLst>
+              <a:ext uri="{28A0092B-C50C-407E-A947-70E740481C1C}">
+                <a14:useLocalDpi xmlns:a14="http://schemas.microsoft.com/office/drawing/2010/main" val="0"/>
+              </a:ext>
+            </a:extLst>
+          </a:blip>
+          <a:srcRect t="-27327" b="-27327"/>
+          <a:stretch>
+            <a:fillRect/>
+          </a:stretch>
+        </p:blipFill>
+        <p:spPr/>
+      </p:pic>
     </p:spTree>
   </p:cSld>
   <p:clrMapOvr>
@@ -3762,7 +3773,7 @@
 </file>
 
 <file path=ppt/slides/slide11.xml><?xml version="1.0" encoding="utf-8"?>
-<p:sld xmlns:a="http://schemas.openxmlformats.org/drawingml/2006/main" xmlns:r="http://schemas.openxmlformats.org/officeDocument/2006/relationships" xmlns:mc="http://schemas.openxmlformats.org/markup-compatibility/2006" xmlns:mv="urn:schemas-microsoft-com:mac:vml" xmlns:p="http://schemas.openxmlformats.org/presentationml/2006/main" mc:Ignorable="mv" mc:PreserveAttributes="mv:*">
+<p:sld xmlns:a="http://schemas.openxmlformats.org/drawingml/2006/main" xmlns:r="http://schemas.openxmlformats.org/officeDocument/2006/relationships" xmlns:p="http://schemas.openxmlformats.org/presentationml/2006/main">
   <p:cSld>
     <p:spTree>
       <p:nvGrpSpPr>
@@ -3829,7 +3840,7 @@
 </file>
 
 <file path=ppt/slides/slide2.xml><?xml version="1.0" encoding="utf-8"?>
-<p:sld xmlns:a="http://schemas.openxmlformats.org/drawingml/2006/main" xmlns:r="http://schemas.openxmlformats.org/officeDocument/2006/relationships" xmlns:mc="http://schemas.openxmlformats.org/markup-compatibility/2006" xmlns:mv="urn:schemas-microsoft-com:mac:vml" xmlns:p="http://schemas.openxmlformats.org/presentationml/2006/main" mc:Ignorable="mv" mc:PreserveAttributes="mv:*">
+<p:sld xmlns:a="http://schemas.openxmlformats.org/drawingml/2006/main" xmlns:r="http://schemas.openxmlformats.org/officeDocument/2006/relationships" xmlns:p="http://schemas.openxmlformats.org/presentationml/2006/main">
   <p:cSld>
     <p:spTree>
       <p:nvGrpSpPr>
@@ -3896,7 +3907,7 @@
 </file>
 
 <file path=ppt/slides/slide3.xml><?xml version="1.0" encoding="utf-8"?>
-<p:sld xmlns:a="http://schemas.openxmlformats.org/drawingml/2006/main" xmlns:r="http://schemas.openxmlformats.org/officeDocument/2006/relationships" xmlns:mc="http://schemas.openxmlformats.org/markup-compatibility/2006" xmlns:mv="urn:schemas-microsoft-com:mac:vml" xmlns:p="http://schemas.openxmlformats.org/presentationml/2006/main" mc:Ignorable="mv" mc:PreserveAttributes="mv:*">
+<p:sld xmlns:a="http://schemas.openxmlformats.org/drawingml/2006/main" xmlns:r="http://schemas.openxmlformats.org/officeDocument/2006/relationships" xmlns:p="http://schemas.openxmlformats.org/presentationml/2006/main">
   <p:cSld>
     <p:spTree>
       <p:nvGrpSpPr>
@@ -3963,7 +3974,7 @@
 </file>
 
 <file path=ppt/slides/slide4.xml><?xml version="1.0" encoding="utf-8"?>
-<p:sld xmlns:a="http://schemas.openxmlformats.org/drawingml/2006/main" xmlns:r="http://schemas.openxmlformats.org/officeDocument/2006/relationships" xmlns:mc="http://schemas.openxmlformats.org/markup-compatibility/2006" xmlns:mv="urn:schemas-microsoft-com:mac:vml" xmlns:p="http://schemas.openxmlformats.org/presentationml/2006/main" mc:Ignorable="mv" mc:PreserveAttributes="mv:*">
+<p:sld xmlns:a="http://schemas.openxmlformats.org/drawingml/2006/main" xmlns:r="http://schemas.openxmlformats.org/officeDocument/2006/relationships" xmlns:p="http://schemas.openxmlformats.org/presentationml/2006/main">
   <p:cSld>
     <p:spTree>
       <p:nvGrpSpPr>
@@ -3996,50 +4007,62 @@
           <a:p>
             <a:r>
               <a:rPr lang="en-US" dirty="0" err="1" smtClean="0"/>
-              <a:t>Keppler</a:t>
+              <a:t>Kepler</a:t>
             </a:r>
             <a:endParaRPr lang="en-US" dirty="0"/>
           </a:p>
         </p:txBody>
       </p:sp>
-      <p:sp>
-        <p:nvSpPr>
-          <p:cNvPr id="4" name="Content Placeholder 3"/>
-          <p:cNvSpPr>
-            <a:spLocks noGrp="1"/>
-          </p:cNvSpPr>
+      <p:pic>
+        <p:nvPicPr>
+          <p:cNvPr id="3" name="Content Placeholder 2" descr="Kepler1.png"/>
+          <p:cNvPicPr>
+            <a:picLocks noGrp="1" noChangeAspect="1"/>
+          </p:cNvPicPr>
           <p:nvPr>
             <p:ph sz="half" idx="1"/>
           </p:nvPr>
-        </p:nvSpPr>
-        <p:spPr/>
-        <p:txBody>
-          <a:bodyPr/>
-          <a:lstStyle/>
-          <a:p>
-            <a:endParaRPr lang="en-US"/>
-          </a:p>
-        </p:txBody>
-      </p:sp>
-      <p:sp>
-        <p:nvSpPr>
-          <p:cNvPr id="5" name="Content Placeholder 4"/>
-          <p:cNvSpPr>
-            <a:spLocks noGrp="1"/>
-          </p:cNvSpPr>
+        </p:nvPicPr>
+        <p:blipFill>
+          <a:blip r:embed="rId2">
+            <a:extLst>
+              <a:ext uri="{28A0092B-C50C-407E-A947-70E740481C1C}">
+                <a14:useLocalDpi xmlns:a14="http://schemas.microsoft.com/office/drawing/2010/main" val="0"/>
+              </a:ext>
+            </a:extLst>
+          </a:blip>
+          <a:srcRect t="-7630" b="-7630"/>
+          <a:stretch>
+            <a:fillRect/>
+          </a:stretch>
+        </p:blipFill>
+        <p:spPr/>
+      </p:pic>
+      <p:pic>
+        <p:nvPicPr>
+          <p:cNvPr id="6" name="Content Placeholder 5" descr="Kepler2.png"/>
+          <p:cNvPicPr>
+            <a:picLocks noGrp="1" noChangeAspect="1"/>
+          </p:cNvPicPr>
           <p:nvPr>
             <p:ph sz="half" idx="2"/>
           </p:nvPr>
-        </p:nvSpPr>
-        <p:spPr/>
-        <p:txBody>
-          <a:bodyPr/>
-          <a:lstStyle/>
-          <a:p>
-            <a:endParaRPr lang="en-US"/>
-          </a:p>
-        </p:txBody>
-      </p:sp>
+        </p:nvPicPr>
+        <p:blipFill>
+          <a:blip r:embed="rId3">
+            <a:extLst>
+              <a:ext uri="{28A0092B-C50C-407E-A947-70E740481C1C}">
+                <a14:useLocalDpi xmlns:a14="http://schemas.microsoft.com/office/drawing/2010/main" val="0"/>
+              </a:ext>
+            </a:extLst>
+          </a:blip>
+          <a:srcRect t="-6207" b="-6207"/>
+          <a:stretch>
+            <a:fillRect/>
+          </a:stretch>
+        </p:blipFill>
+        <p:spPr/>
+      </p:pic>
     </p:spTree>
   </p:cSld>
   <p:clrMapOvr>
@@ -4049,7 +4072,7 @@
 </file>
 
 <file path=ppt/slides/slide5.xml><?xml version="1.0" encoding="utf-8"?>
-<p:sld xmlns:a="http://schemas.openxmlformats.org/drawingml/2006/main" xmlns:r="http://schemas.openxmlformats.org/officeDocument/2006/relationships" xmlns:mc="http://schemas.openxmlformats.org/markup-compatibility/2006" xmlns:mv="urn:schemas-microsoft-com:mac:vml" xmlns:p="http://schemas.openxmlformats.org/presentationml/2006/main" mc:Ignorable="mv" mc:PreserveAttributes="mv:*">
+<p:sld xmlns:a="http://schemas.openxmlformats.org/drawingml/2006/main" xmlns:r="http://schemas.openxmlformats.org/officeDocument/2006/relationships" xmlns:p="http://schemas.openxmlformats.org/presentationml/2006/main">
   <p:cSld>
     <p:spTree>
       <p:nvGrpSpPr>
@@ -4088,44 +4111,56 @@
           </a:p>
         </p:txBody>
       </p:sp>
-      <p:sp>
-        <p:nvSpPr>
-          <p:cNvPr id="4" name="Content Placeholder 3"/>
-          <p:cNvSpPr>
-            <a:spLocks noGrp="1"/>
-          </p:cNvSpPr>
+      <p:pic>
+        <p:nvPicPr>
+          <p:cNvPr id="3" name="Content Placeholder 2" descr="Taverna1.jpeg"/>
+          <p:cNvPicPr>
+            <a:picLocks noGrp="1" noChangeAspect="1"/>
+          </p:cNvPicPr>
           <p:nvPr>
             <p:ph sz="half" idx="1"/>
           </p:nvPr>
-        </p:nvSpPr>
-        <p:spPr/>
-        <p:txBody>
-          <a:bodyPr/>
-          <a:lstStyle/>
-          <a:p>
-            <a:endParaRPr lang="en-US"/>
-          </a:p>
-        </p:txBody>
-      </p:sp>
-      <p:sp>
-        <p:nvSpPr>
-          <p:cNvPr id="5" name="Content Placeholder 4"/>
-          <p:cNvSpPr>
-            <a:spLocks noGrp="1"/>
-          </p:cNvSpPr>
+        </p:nvPicPr>
+        <p:blipFill>
+          <a:blip r:embed="rId2">
+            <a:extLst>
+              <a:ext uri="{28A0092B-C50C-407E-A947-70E740481C1C}">
+                <a14:useLocalDpi xmlns:a14="http://schemas.microsoft.com/office/drawing/2010/main" val="0"/>
+              </a:ext>
+            </a:extLst>
+          </a:blip>
+          <a:srcRect t="-27218" b="-27218"/>
+          <a:stretch>
+            <a:fillRect/>
+          </a:stretch>
+        </p:blipFill>
+        <p:spPr/>
+      </p:pic>
+      <p:pic>
+        <p:nvPicPr>
+          <p:cNvPr id="6" name="Content Placeholder 5" descr="Taverna2.png"/>
+          <p:cNvPicPr>
+            <a:picLocks noGrp="1" noChangeAspect="1"/>
+          </p:cNvPicPr>
           <p:nvPr>
             <p:ph sz="half" idx="2"/>
           </p:nvPr>
-        </p:nvSpPr>
-        <p:spPr/>
-        <p:txBody>
-          <a:bodyPr/>
-          <a:lstStyle/>
-          <a:p>
-            <a:endParaRPr lang="en-US"/>
-          </a:p>
-        </p:txBody>
-      </p:sp>
+        </p:nvPicPr>
+        <p:blipFill>
+          <a:blip r:embed="rId3">
+            <a:extLst>
+              <a:ext uri="{28A0092B-C50C-407E-A947-70E740481C1C}">
+                <a14:useLocalDpi xmlns:a14="http://schemas.microsoft.com/office/drawing/2010/main" val="0"/>
+              </a:ext>
+            </a:extLst>
+          </a:blip>
+          <a:srcRect t="-36404" b="-36404"/>
+          <a:stretch>
+            <a:fillRect/>
+          </a:stretch>
+        </p:blipFill>
+        <p:spPr/>
+      </p:pic>
     </p:spTree>
   </p:cSld>
   <p:clrMapOvr>
@@ -4135,7 +4170,7 @@
 </file>
 
 <file path=ppt/slides/slide6.xml><?xml version="1.0" encoding="utf-8"?>
-<p:sld xmlns:a="http://schemas.openxmlformats.org/drawingml/2006/main" xmlns:r="http://schemas.openxmlformats.org/officeDocument/2006/relationships" xmlns:mc="http://schemas.openxmlformats.org/markup-compatibility/2006" xmlns:mv="urn:schemas-microsoft-com:mac:vml" xmlns:p="http://schemas.openxmlformats.org/presentationml/2006/main" mc:Ignorable="mv" mc:PreserveAttributes="mv:*">
+<p:sld xmlns:a="http://schemas.openxmlformats.org/drawingml/2006/main" xmlns:r="http://schemas.openxmlformats.org/officeDocument/2006/relationships" xmlns:p="http://schemas.openxmlformats.org/presentationml/2006/main">
   <p:cSld>
     <p:spTree>
       <p:nvGrpSpPr>
@@ -4221,7 +4256,7 @@
 </file>
 
 <file path=ppt/slides/slide7.xml><?xml version="1.0" encoding="utf-8"?>
-<p:sld xmlns:a="http://schemas.openxmlformats.org/drawingml/2006/main" xmlns:r="http://schemas.openxmlformats.org/officeDocument/2006/relationships" xmlns:mc="http://schemas.openxmlformats.org/markup-compatibility/2006" xmlns:mv="urn:schemas-microsoft-com:mac:vml" xmlns:p="http://schemas.openxmlformats.org/presentationml/2006/main" mc:Ignorable="mv" mc:PreserveAttributes="mv:*">
+<p:sld xmlns:a="http://schemas.openxmlformats.org/drawingml/2006/main" xmlns:r="http://schemas.openxmlformats.org/officeDocument/2006/relationships" xmlns:p="http://schemas.openxmlformats.org/presentationml/2006/main">
   <p:cSld>
     <p:spTree>
       <p:nvGrpSpPr>
@@ -4260,44 +4295,31 @@
           </a:p>
         </p:txBody>
       </p:sp>
-      <p:sp>
-        <p:nvSpPr>
-          <p:cNvPr id="8" name="Content Placeholder 7"/>
-          <p:cNvSpPr>
-            <a:spLocks noGrp="1"/>
-          </p:cNvSpPr>
-          <p:nvPr>
-            <p:ph sz="half" idx="1"/>
-          </p:nvPr>
-        </p:nvSpPr>
-        <p:spPr/>
-        <p:txBody>
-          <a:bodyPr/>
-          <a:lstStyle/>
-          <a:p>
-            <a:endParaRPr lang="en-US"/>
-          </a:p>
-        </p:txBody>
-      </p:sp>
-      <p:sp>
-        <p:nvSpPr>
-          <p:cNvPr id="9" name="Content Placeholder 8"/>
-          <p:cNvSpPr>
-            <a:spLocks noGrp="1"/>
-          </p:cNvSpPr>
-          <p:nvPr>
-            <p:ph sz="half" idx="2"/>
-          </p:nvPr>
-        </p:nvSpPr>
-        <p:spPr/>
-        <p:txBody>
-          <a:bodyPr/>
-          <a:lstStyle/>
-          <a:p>
-            <a:endParaRPr lang="en-US"/>
-          </a:p>
-        </p:txBody>
-      </p:sp>
+      <p:pic>
+        <p:nvPicPr>
+          <p:cNvPr id="4" name="Content Placeholder 3" descr="yahoopipes1.gif"/>
+          <p:cNvPicPr>
+            <a:picLocks noGrp="1" noChangeAspect="1"/>
+          </p:cNvPicPr>
+          <p:nvPr>
+            <p:ph idx="1"/>
+          </p:nvPr>
+        </p:nvPicPr>
+        <p:blipFill>
+          <a:blip r:embed="rId2">
+            <a:extLst>
+              <a:ext uri="{28A0092B-C50C-407E-A947-70E740481C1C}">
+                <a14:useLocalDpi xmlns:a14="http://schemas.microsoft.com/office/drawing/2010/main" val="0"/>
+              </a:ext>
+            </a:extLst>
+          </a:blip>
+          <a:srcRect l="-34243" r="-34243"/>
+          <a:stretch>
+            <a:fillRect/>
+          </a:stretch>
+        </p:blipFill>
+        <p:spPr/>
+      </p:pic>
     </p:spTree>
   </p:cSld>
   <p:clrMapOvr>
@@ -4307,7 +4329,7 @@
 </file>
 
 <file path=ppt/slides/slide8.xml><?xml version="1.0" encoding="utf-8"?>
-<p:sld xmlns:a="http://schemas.openxmlformats.org/drawingml/2006/main" xmlns:r="http://schemas.openxmlformats.org/officeDocument/2006/relationships" xmlns:mc="http://schemas.openxmlformats.org/markup-compatibility/2006" xmlns:mv="urn:schemas-microsoft-com:mac:vml" xmlns:p="http://schemas.openxmlformats.org/presentationml/2006/main" mc:Ignorable="mv" mc:PreserveAttributes="mv:*">
+<p:sld xmlns:a="http://schemas.openxmlformats.org/drawingml/2006/main" xmlns:r="http://schemas.openxmlformats.org/officeDocument/2006/relationships" xmlns:p="http://schemas.openxmlformats.org/presentationml/2006/main">
   <p:cSld>
     <p:spTree>
       <p:nvGrpSpPr>
@@ -4346,44 +4368,31 @@
           </a:p>
         </p:txBody>
       </p:sp>
-      <p:sp>
-        <p:nvSpPr>
-          <p:cNvPr id="4" name="Content Placeholder 3"/>
-          <p:cNvSpPr>
-            <a:spLocks noGrp="1"/>
-          </p:cNvSpPr>
-          <p:nvPr>
-            <p:ph sz="half" idx="1"/>
-          </p:nvPr>
-        </p:nvSpPr>
-        <p:spPr/>
-        <p:txBody>
-          <a:bodyPr/>
-          <a:lstStyle/>
-          <a:p>
-            <a:endParaRPr lang="en-US"/>
-          </a:p>
-        </p:txBody>
-      </p:sp>
-      <p:sp>
-        <p:nvSpPr>
-          <p:cNvPr id="5" name="Content Placeholder 4"/>
-          <p:cNvSpPr>
-            <a:spLocks noGrp="1"/>
-          </p:cNvSpPr>
-          <p:nvPr>
-            <p:ph sz="half" idx="2"/>
-          </p:nvPr>
-        </p:nvSpPr>
-        <p:spPr/>
-        <p:txBody>
-          <a:bodyPr/>
-          <a:lstStyle/>
-          <a:p>
-            <a:endParaRPr lang="en-US"/>
-          </a:p>
-        </p:txBody>
-      </p:sp>
+      <p:pic>
+        <p:nvPicPr>
+          <p:cNvPr id="6" name="Content Placeholder 5" descr="Mobyle1.png"/>
+          <p:cNvPicPr>
+            <a:picLocks noGrp="1" noChangeAspect="1"/>
+          </p:cNvPicPr>
+          <p:nvPr>
+            <p:ph idx="1"/>
+          </p:nvPr>
+        </p:nvPicPr>
+        <p:blipFill>
+          <a:blip r:embed="rId2">
+            <a:extLst>
+              <a:ext uri="{28A0092B-C50C-407E-A947-70E740481C1C}">
+                <a14:useLocalDpi xmlns:a14="http://schemas.microsoft.com/office/drawing/2010/main" val="0"/>
+              </a:ext>
+            </a:extLst>
+          </a:blip>
+          <a:srcRect l="-2703" r="-2703"/>
+          <a:stretch>
+            <a:fillRect/>
+          </a:stretch>
+        </p:blipFill>
+        <p:spPr/>
+      </p:pic>
     </p:spTree>
   </p:cSld>
   <p:clrMapOvr>
@@ -4393,7 +4402,7 @@
 </file>
 
 <file path=ppt/slides/slide9.xml><?xml version="1.0" encoding="utf-8"?>
-<p:sld xmlns:a="http://schemas.openxmlformats.org/drawingml/2006/main" xmlns:r="http://schemas.openxmlformats.org/officeDocument/2006/relationships" xmlns:mc="http://schemas.openxmlformats.org/markup-compatibility/2006" xmlns:mv="urn:schemas-microsoft-com:mac:vml" xmlns:p="http://schemas.openxmlformats.org/presentationml/2006/main" mc:Ignorable="mv" mc:PreserveAttributes="mv:*">
+<p:sld xmlns:a="http://schemas.openxmlformats.org/drawingml/2006/main" xmlns:r="http://schemas.openxmlformats.org/officeDocument/2006/relationships" xmlns:p="http://schemas.openxmlformats.org/presentationml/2006/main">
   <p:cSld>
     <p:spTree>
       <p:nvGrpSpPr>
@@ -4432,44 +4441,56 @@
           </a:p>
         </p:txBody>
       </p:sp>
-      <p:sp>
-        <p:nvSpPr>
-          <p:cNvPr id="4" name="Content Placeholder 3"/>
-          <p:cNvSpPr>
-            <a:spLocks noGrp="1"/>
-          </p:cNvSpPr>
+      <p:pic>
+        <p:nvPicPr>
+          <p:cNvPr id="3" name="Content Placeholder 2" descr="Galaxy1.png"/>
+          <p:cNvPicPr>
+            <a:picLocks noGrp="1" noChangeAspect="1"/>
+          </p:cNvPicPr>
           <p:nvPr>
             <p:ph sz="half" idx="1"/>
           </p:nvPr>
-        </p:nvSpPr>
-        <p:spPr/>
-        <p:txBody>
-          <a:bodyPr/>
-          <a:lstStyle/>
-          <a:p>
-            <a:endParaRPr lang="en-US"/>
-          </a:p>
-        </p:txBody>
-      </p:sp>
-      <p:sp>
-        <p:nvSpPr>
-          <p:cNvPr id="5" name="Content Placeholder 4"/>
-          <p:cNvSpPr>
-            <a:spLocks noGrp="1"/>
-          </p:cNvSpPr>
+        </p:nvPicPr>
+        <p:blipFill>
+          <a:blip r:embed="rId2">
+            <a:extLst>
+              <a:ext uri="{28A0092B-C50C-407E-A947-70E740481C1C}">
+                <a14:useLocalDpi xmlns:a14="http://schemas.microsoft.com/office/drawing/2010/main" val="0"/>
+              </a:ext>
+            </a:extLst>
+          </a:blip>
+          <a:srcRect t="-65798" b="-65798"/>
+          <a:stretch>
+            <a:fillRect/>
+          </a:stretch>
+        </p:blipFill>
+        <p:spPr/>
+      </p:pic>
+      <p:pic>
+        <p:nvPicPr>
+          <p:cNvPr id="6" name="Content Placeholder 5" descr="Galaxy2.png"/>
+          <p:cNvPicPr>
+            <a:picLocks noGrp="1" noChangeAspect="1"/>
+          </p:cNvPicPr>
           <p:nvPr>
             <p:ph sz="half" idx="2"/>
           </p:nvPr>
-        </p:nvSpPr>
-        <p:spPr/>
-        <p:txBody>
-          <a:bodyPr/>
-          <a:lstStyle/>
-          <a:p>
-            <a:endParaRPr lang="en-US"/>
-          </a:p>
-        </p:txBody>
-      </p:sp>
+        </p:nvPicPr>
+        <p:blipFill>
+          <a:blip r:embed="rId3">
+            <a:extLst>
+              <a:ext uri="{28A0092B-C50C-407E-A947-70E740481C1C}">
+                <a14:useLocalDpi xmlns:a14="http://schemas.microsoft.com/office/drawing/2010/main" val="0"/>
+              </a:ext>
+            </a:extLst>
+          </a:blip>
+          <a:srcRect t="-24594" b="-24594"/>
+          <a:stretch>
+            <a:fillRect/>
+          </a:stretch>
+        </p:blipFill>
+        <p:spPr/>
+      </p:pic>
     </p:spTree>
   </p:cSld>
   <p:clrMapOvr>

</xml_diff>